<commit_message>
tmf center monitoring schematic added
</commit_message>
<xml_diff>
--- a/img/Figure_editing.pptx
+++ b/img/Figure_editing.pptx
@@ -17,6 +17,7 @@
     <p:sldId id="261" r:id="rId11"/>
     <p:sldId id="262" r:id="rId12"/>
     <p:sldId id="267" r:id="rId13"/>
+    <p:sldId id="268" r:id="rId14"/>
   </p:sldIdLst>
   <p:sldSz cx="12192000" cy="6858000"/>
   <p:notesSz cx="6858000" cy="9144000"/>
@@ -6770,6 +6771,1660 @@
     <p:extLst>
       <p:ext uri="{BB962C8B-B14F-4D97-AF65-F5344CB8AC3E}">
         <p14:creationId xmlns:p14="http://schemas.microsoft.com/office/powerpoint/2010/main" val="3904209933"/>
+      </p:ext>
+    </p:extLst>
+  </p:cSld>
+  <p:clrMapOvr>
+    <a:masterClrMapping/>
+  </p:clrMapOvr>
+</p:sld>
+</file>
+
+<file path=ppt/slides/slide13.xml><?xml version="1.0" encoding="utf-8"?>
+<p:sld xmlns:a="http://schemas.openxmlformats.org/drawingml/2006/main" xmlns:r="http://schemas.openxmlformats.org/officeDocument/2006/relationships" xmlns:p="http://schemas.openxmlformats.org/presentationml/2006/main">
+  <p:cSld>
+    <p:spTree>
+      <p:nvGrpSpPr>
+        <p:cNvPr id="1" name=""/>
+        <p:cNvGrpSpPr/>
+        <p:nvPr/>
+      </p:nvGrpSpPr>
+      <p:grpSpPr>
+        <a:xfrm>
+          <a:off x="0" y="0"/>
+          <a:ext cx="0" cy="0"/>
+          <a:chOff x="0" y="0"/>
+          <a:chExt cx="0" cy="0"/>
+        </a:xfrm>
+      </p:grpSpPr>
+      <p:grpSp>
+        <p:nvGrpSpPr>
+          <p:cNvPr id="4" name="Group 3">
+            <a:extLst>
+              <a:ext uri="{FF2B5EF4-FFF2-40B4-BE49-F238E27FC236}">
+                <a16:creationId xmlns:a16="http://schemas.microsoft.com/office/drawing/2014/main" id="{C2D26F88-BA92-4D62-D1CF-6BF7C5EDF0D7}"/>
+              </a:ext>
+            </a:extLst>
+          </p:cNvPr>
+          <p:cNvGrpSpPr/>
+          <p:nvPr/>
+        </p:nvGrpSpPr>
+        <p:grpSpPr>
+          <a:xfrm>
+            <a:off x="1776846" y="1830573"/>
+            <a:ext cx="9119727" cy="3196854"/>
+            <a:chOff x="571500" y="2074439"/>
+            <a:chExt cx="9119727" cy="3196854"/>
+          </a:xfrm>
+        </p:grpSpPr>
+        <p:sp>
+          <p:nvSpPr>
+            <p:cNvPr id="5" name="Rectangle 4">
+              <a:extLst>
+                <a:ext uri="{FF2B5EF4-FFF2-40B4-BE49-F238E27FC236}">
+                  <a16:creationId xmlns:a16="http://schemas.microsoft.com/office/drawing/2014/main" id="{90ED2986-8066-F6BF-5A51-A322D7D85D67}"/>
+                </a:ext>
+              </a:extLst>
+            </p:cNvPr>
+            <p:cNvSpPr/>
+            <p:nvPr/>
+          </p:nvSpPr>
+          <p:spPr>
+            <a:xfrm>
+              <a:off x="571500" y="2074439"/>
+              <a:ext cx="9066380" cy="3196854"/>
+            </a:xfrm>
+            <a:prstGeom prst="rect">
+              <a:avLst/>
+            </a:prstGeom>
+            <a:solidFill>
+              <a:schemeClr val="bg1"/>
+            </a:solidFill>
+            <a:ln>
+              <a:solidFill>
+                <a:schemeClr val="bg1"/>
+              </a:solidFill>
+            </a:ln>
+          </p:spPr>
+          <p:style>
+            <a:lnRef idx="2">
+              <a:schemeClr val="accent1">
+                <a:shade val="15000"/>
+              </a:schemeClr>
+            </a:lnRef>
+            <a:fillRef idx="1">
+              <a:schemeClr val="accent1"/>
+            </a:fillRef>
+            <a:effectRef idx="0">
+              <a:schemeClr val="accent1"/>
+            </a:effectRef>
+            <a:fontRef idx="minor">
+              <a:schemeClr val="lt1"/>
+            </a:fontRef>
+          </p:style>
+          <p:txBody>
+            <a:bodyPr rtlCol="0" anchor="ctr"/>
+            <a:lstStyle/>
+            <a:p>
+              <a:pPr algn="ctr"/>
+              <a:endParaRPr lang="en-US"/>
+            </a:p>
+          </p:txBody>
+        </p:sp>
+        <p:grpSp>
+          <p:nvGrpSpPr>
+            <p:cNvPr id="6" name="Group 5">
+              <a:extLst>
+                <a:ext uri="{FF2B5EF4-FFF2-40B4-BE49-F238E27FC236}">
+                  <a16:creationId xmlns:a16="http://schemas.microsoft.com/office/drawing/2014/main" id="{A65CC5B3-AF96-A2D5-36EF-AEAB6DA38DE0}"/>
+                </a:ext>
+              </a:extLst>
+            </p:cNvPr>
+            <p:cNvGrpSpPr/>
+            <p:nvPr/>
+          </p:nvGrpSpPr>
+          <p:grpSpPr>
+            <a:xfrm>
+              <a:off x="666518" y="2074439"/>
+              <a:ext cx="9024709" cy="3103704"/>
+              <a:chOff x="666518" y="2074439"/>
+              <a:chExt cx="9024709" cy="3103704"/>
+            </a:xfrm>
+          </p:grpSpPr>
+          <p:sp>
+            <p:nvSpPr>
+              <p:cNvPr id="7" name="Arrow: Right 6">
+                <a:extLst>
+                  <a:ext uri="{FF2B5EF4-FFF2-40B4-BE49-F238E27FC236}">
+                    <a16:creationId xmlns:a16="http://schemas.microsoft.com/office/drawing/2014/main" id="{2B2885F0-47F5-5624-7F9A-D4FAC817174E}"/>
+                  </a:ext>
+                </a:extLst>
+              </p:cNvPr>
+              <p:cNvSpPr/>
+              <p:nvPr/>
+            </p:nvSpPr>
+            <p:spPr>
+              <a:xfrm>
+                <a:off x="5371796" y="2074439"/>
+                <a:ext cx="3062113" cy="901618"/>
+              </a:xfrm>
+              <a:prstGeom prst="rightArrow">
+                <a:avLst/>
+              </a:prstGeom>
+              <a:gradFill>
+                <a:gsLst>
+                  <a:gs pos="0">
+                    <a:schemeClr val="bg1">
+                      <a:alpha val="0"/>
+                    </a:schemeClr>
+                  </a:gs>
+                  <a:gs pos="36000">
+                    <a:schemeClr val="accent2">
+                      <a:lumMod val="40000"/>
+                      <a:lumOff val="60000"/>
+                    </a:schemeClr>
+                  </a:gs>
+                  <a:gs pos="80000">
+                    <a:schemeClr val="accent2">
+                      <a:lumMod val="60000"/>
+                      <a:lumOff val="40000"/>
+                    </a:schemeClr>
+                  </a:gs>
+                  <a:gs pos="100000">
+                    <a:schemeClr val="accent2"/>
+                  </a:gs>
+                </a:gsLst>
+                <a:lin ang="0" scaled="0"/>
+              </a:gradFill>
+              <a:ln>
+                <a:noFill/>
+              </a:ln>
+            </p:spPr>
+            <p:style>
+              <a:lnRef idx="2">
+                <a:schemeClr val="accent1">
+                  <a:shade val="50000"/>
+                </a:schemeClr>
+              </a:lnRef>
+              <a:fillRef idx="1">
+                <a:schemeClr val="accent1"/>
+              </a:fillRef>
+              <a:effectRef idx="0">
+                <a:schemeClr val="accent1"/>
+              </a:effectRef>
+              <a:fontRef idx="minor">
+                <a:schemeClr val="lt1"/>
+              </a:fontRef>
+            </p:style>
+            <p:txBody>
+              <a:bodyPr rtlCol="0" anchor="ctr"/>
+              <a:lstStyle/>
+              <a:p>
+                <a:pPr algn="r"/>
+                <a:endParaRPr lang="en-US" sz="1600" dirty="0">
+                  <a:solidFill>
+                    <a:schemeClr val="tx1"/>
+                  </a:solidFill>
+                </a:endParaRPr>
+              </a:p>
+            </p:txBody>
+          </p:sp>
+          <p:pic>
+            <p:nvPicPr>
+              <p:cNvPr id="8" name="Picture 7">
+                <a:extLst>
+                  <a:ext uri="{FF2B5EF4-FFF2-40B4-BE49-F238E27FC236}">
+                    <a16:creationId xmlns:a16="http://schemas.microsoft.com/office/drawing/2014/main" id="{F84E2B01-6D0B-DF32-2BB7-0B9DD449E582}"/>
+                  </a:ext>
+                </a:extLst>
+              </p:cNvPr>
+              <p:cNvPicPr>
+                <a:picLocks noChangeAspect="1"/>
+              </p:cNvPicPr>
+              <p:nvPr/>
+            </p:nvPicPr>
+            <p:blipFill>
+              <a:blip r:embed="rId2"/>
+              <a:stretch>
+                <a:fillRect/>
+              </a:stretch>
+            </p:blipFill>
+            <p:spPr>
+              <a:xfrm>
+                <a:off x="666518" y="3224167"/>
+                <a:ext cx="2026798" cy="1261525"/>
+              </a:xfrm>
+              <a:prstGeom prst="rect">
+                <a:avLst/>
+              </a:prstGeom>
+            </p:spPr>
+          </p:pic>
+          <p:pic>
+            <p:nvPicPr>
+              <p:cNvPr id="9" name="Picture 8">
+                <a:extLst>
+                  <a:ext uri="{FF2B5EF4-FFF2-40B4-BE49-F238E27FC236}">
+                    <a16:creationId xmlns:a16="http://schemas.microsoft.com/office/drawing/2014/main" id="{5F0824E8-DB8D-9ADB-4664-F8E64F2EF087}"/>
+                  </a:ext>
+                </a:extLst>
+              </p:cNvPr>
+              <p:cNvPicPr>
+                <a:picLocks noChangeAspect="1"/>
+              </p:cNvPicPr>
+              <p:nvPr/>
+            </p:nvPicPr>
+            <p:blipFill>
+              <a:blip r:embed="rId3" cstate="email">
+                <a:extLst>
+                  <a:ext uri="{28A0092B-C50C-407E-A947-70E740481C1C}">
+                    <a14:useLocalDpi xmlns:a14="http://schemas.microsoft.com/office/drawing/2010/main"/>
+                  </a:ext>
+                </a:extLst>
+              </a:blip>
+              <a:stretch>
+                <a:fillRect/>
+              </a:stretch>
+            </p:blipFill>
+            <p:spPr>
+              <a:xfrm>
+                <a:off x="697985" y="2204650"/>
+                <a:ext cx="682442" cy="682442"/>
+              </a:xfrm>
+              <a:prstGeom prst="rect">
+                <a:avLst/>
+              </a:prstGeom>
+            </p:spPr>
+          </p:pic>
+          <p:sp>
+            <p:nvSpPr>
+              <p:cNvPr id="10" name="TextBox 9">
+                <a:extLst>
+                  <a:ext uri="{FF2B5EF4-FFF2-40B4-BE49-F238E27FC236}">
+                    <a16:creationId xmlns:a16="http://schemas.microsoft.com/office/drawing/2014/main" id="{EE2BE5DF-5A12-80E4-641F-E4EBCDE24D6E}"/>
+                  </a:ext>
+                </a:extLst>
+              </p:cNvPr>
+              <p:cNvSpPr txBox="1"/>
+              <p:nvPr/>
+            </p:nvSpPr>
+            <p:spPr>
+              <a:xfrm>
+                <a:off x="2446990" y="3645118"/>
+                <a:ext cx="1018446" cy="738664"/>
+              </a:xfrm>
+              <a:prstGeom prst="rect">
+                <a:avLst/>
+              </a:prstGeom>
+              <a:solidFill>
+                <a:schemeClr val="bg1">
+                  <a:alpha val="28000"/>
+                </a:schemeClr>
+              </a:solidFill>
+            </p:spPr>
+            <p:txBody>
+              <a:bodyPr wrap="square" lIns="0" tIns="0" rIns="0" bIns="0" rtlCol="0">
+                <a:spAutoFit/>
+              </a:bodyPr>
+              <a:lstStyle/>
+              <a:p>
+                <a:pPr algn="ctr"/>
+                <a:r>
+                  <a:rPr lang="en-US" sz="1200" b="1" dirty="0"/>
+                  <a:t>NGC</a:t>
+                </a:r>
+              </a:p>
+              <a:p>
+                <a:pPr algn="ctr"/>
+                <a:r>
+                  <a:rPr lang="en-US" sz="1200" dirty="0"/>
+                  <a:t>(Next Generation Control)</a:t>
+                </a:r>
+              </a:p>
+            </p:txBody>
+          </p:sp>
+          <p:pic>
+            <p:nvPicPr>
+              <p:cNvPr id="11" name="Picture 4" descr="Haas Logo PNG Vector (SVG) Free Download">
+                <a:extLst>
+                  <a:ext uri="{FF2B5EF4-FFF2-40B4-BE49-F238E27FC236}">
+                    <a16:creationId xmlns:a16="http://schemas.microsoft.com/office/drawing/2014/main" id="{C82B780A-5DCA-D4A9-1C04-8B5070498FE3}"/>
+                  </a:ext>
+                </a:extLst>
+              </p:cNvPr>
+              <p:cNvPicPr>
+                <a:picLocks noChangeAspect="1" noChangeArrowheads="1"/>
+              </p:cNvPicPr>
+              <p:nvPr/>
+            </p:nvPicPr>
+            <p:blipFill>
+              <a:blip r:embed="rId4" cstate="print">
+                <a:extLst>
+                  <a:ext uri="{28A0092B-C50C-407E-A947-70E740481C1C}">
+                    <a14:useLocalDpi xmlns:a14="http://schemas.microsoft.com/office/drawing/2010/main" val="0"/>
+                  </a:ext>
+                </a:extLst>
+              </a:blip>
+              <a:srcRect/>
+              <a:stretch>
+                <a:fillRect/>
+              </a:stretch>
+            </p:blipFill>
+            <p:spPr bwMode="auto">
+              <a:xfrm>
+                <a:off x="2686914" y="3224167"/>
+                <a:ext cx="559377" cy="451231"/>
+              </a:xfrm>
+              <a:prstGeom prst="rect">
+                <a:avLst/>
+              </a:prstGeom>
+              <a:noFill/>
+              <a:extLst>
+                <a:ext uri="{909E8E84-426E-40DD-AFC4-6F175D3DCCD1}">
+                  <a14:hiddenFill xmlns:a14="http://schemas.microsoft.com/office/drawing/2010/main">
+                    <a:solidFill>
+                      <a:srgbClr val="FFFFFF"/>
+                    </a:solidFill>
+                  </a14:hiddenFill>
+                </a:ext>
+              </a:extLst>
+            </p:spPr>
+          </p:pic>
+          <p:pic>
+            <p:nvPicPr>
+              <p:cNvPr id="12" name="Picture 6" descr="Raspberry Pi 4 - Edge Impulse Documentation">
+                <a:extLst>
+                  <a:ext uri="{FF2B5EF4-FFF2-40B4-BE49-F238E27FC236}">
+                    <a16:creationId xmlns:a16="http://schemas.microsoft.com/office/drawing/2014/main" id="{B5D02940-E71F-E116-BD83-3B0B09A2FC89}"/>
+                  </a:ext>
+                </a:extLst>
+              </p:cNvPr>
+              <p:cNvPicPr>
+                <a:picLocks noChangeAspect="1" noChangeArrowheads="1"/>
+              </p:cNvPicPr>
+              <p:nvPr/>
+            </p:nvPicPr>
+            <p:blipFill rotWithShape="1">
+              <a:blip r:embed="rId5" cstate="print">
+                <a:extLst>
+                  <a:ext uri="{28A0092B-C50C-407E-A947-70E740481C1C}">
+                    <a14:useLocalDpi xmlns:a14="http://schemas.microsoft.com/office/drawing/2010/main" val="0"/>
+                  </a:ext>
+                </a:extLst>
+              </a:blip>
+              <a:srcRect r="10317"/>
+              <a:stretch/>
+            </p:blipFill>
+            <p:spPr bwMode="auto">
+              <a:xfrm>
+                <a:off x="4530257" y="2805696"/>
+                <a:ext cx="1013294" cy="715718"/>
+              </a:xfrm>
+              <a:prstGeom prst="rect">
+                <a:avLst/>
+              </a:prstGeom>
+              <a:noFill/>
+              <a:extLst>
+                <a:ext uri="{909E8E84-426E-40DD-AFC4-6F175D3DCCD1}">
+                  <a14:hiddenFill xmlns:a14="http://schemas.microsoft.com/office/drawing/2010/main">
+                    <a:solidFill>
+                      <a:srgbClr val="FFFFFF"/>
+                    </a:solidFill>
+                  </a14:hiddenFill>
+                </a:ext>
+              </a:extLst>
+            </p:spPr>
+          </p:pic>
+          <p:sp>
+            <p:nvSpPr>
+              <p:cNvPr id="13" name="TextBox 12">
+                <a:extLst>
+                  <a:ext uri="{FF2B5EF4-FFF2-40B4-BE49-F238E27FC236}">
+                    <a16:creationId xmlns:a16="http://schemas.microsoft.com/office/drawing/2014/main" id="{9CBF6079-B381-59EC-D6A8-6E962436E3AC}"/>
+                  </a:ext>
+                </a:extLst>
+              </p:cNvPr>
+              <p:cNvSpPr txBox="1"/>
+              <p:nvPr/>
+            </p:nvSpPr>
+            <p:spPr>
+              <a:xfrm>
+                <a:off x="1007918" y="4498083"/>
+                <a:ext cx="1675007" cy="338554"/>
+              </a:xfrm>
+              <a:prstGeom prst="rect">
+                <a:avLst/>
+              </a:prstGeom>
+              <a:noFill/>
+            </p:spPr>
+            <p:txBody>
+              <a:bodyPr wrap="square" rtlCol="0">
+                <a:spAutoFit/>
+              </a:bodyPr>
+              <a:lstStyle/>
+              <a:p>
+                <a:pPr algn="ctr"/>
+                <a:r>
+                  <a:rPr lang="en-US" sz="1600" dirty="0"/>
+                  <a:t>Haas VF10/50</a:t>
+                </a:r>
+              </a:p>
+            </p:txBody>
+          </p:sp>
+          <p:cxnSp>
+            <p:nvCxnSpPr>
+              <p:cNvPr id="14" name="Connector: Elbow 13">
+                <a:extLst>
+                  <a:ext uri="{FF2B5EF4-FFF2-40B4-BE49-F238E27FC236}">
+                    <a16:creationId xmlns:a16="http://schemas.microsoft.com/office/drawing/2014/main" id="{C1C01986-3DE8-0A53-9B22-F32B25D50FCA}"/>
+                  </a:ext>
+                </a:extLst>
+              </p:cNvPr>
+              <p:cNvCxnSpPr>
+                <a:cxnSpLocks/>
+                <a:stCxn id="11" idx="3"/>
+                <a:endCxn id="12" idx="1"/>
+              </p:cNvCxnSpPr>
+              <p:nvPr/>
+            </p:nvCxnSpPr>
+            <p:spPr>
+              <a:xfrm flipV="1">
+                <a:off x="3246291" y="3163555"/>
+                <a:ext cx="1283966" cy="286228"/>
+              </a:xfrm>
+              <a:prstGeom prst="bentConnector3">
+                <a:avLst>
+                  <a:gd name="adj1" fmla="val 50000"/>
+                </a:avLst>
+              </a:prstGeom>
+              <a:ln>
+                <a:solidFill>
+                  <a:schemeClr val="tx1"/>
+                </a:solidFill>
+                <a:tailEnd type="triangle"/>
+              </a:ln>
+            </p:spPr>
+            <p:style>
+              <a:lnRef idx="1">
+                <a:schemeClr val="accent1"/>
+              </a:lnRef>
+              <a:fillRef idx="0">
+                <a:schemeClr val="accent1"/>
+              </a:fillRef>
+              <a:effectRef idx="0">
+                <a:schemeClr val="accent1"/>
+              </a:effectRef>
+              <a:fontRef idx="minor">
+                <a:schemeClr val="tx1"/>
+              </a:fontRef>
+            </p:style>
+          </p:cxnSp>
+          <p:pic>
+            <p:nvPicPr>
+              <p:cNvPr id="15" name="Picture 4" descr="littmann stethoscope classic 3에 대한 이미지 검색결과">
+                <a:extLst>
+                  <a:ext uri="{FF2B5EF4-FFF2-40B4-BE49-F238E27FC236}">
+                    <a16:creationId xmlns:a16="http://schemas.microsoft.com/office/drawing/2014/main" id="{7B1CD6DC-3682-9B61-746C-A557D0595221}"/>
+                  </a:ext>
+                </a:extLst>
+              </p:cNvPr>
+              <p:cNvPicPr>
+                <a:picLocks noChangeAspect="1" noChangeArrowheads="1"/>
+              </p:cNvPicPr>
+              <p:nvPr/>
+            </p:nvPicPr>
+            <p:blipFill>
+              <a:blip r:embed="rId6" cstate="print">
+                <a:extLst>
+                  <a:ext uri="{28A0092B-C50C-407E-A947-70E740481C1C}">
+                    <a14:useLocalDpi xmlns:a14="http://schemas.microsoft.com/office/drawing/2010/main"/>
+                  </a:ext>
+                </a:extLst>
+              </a:blip>
+              <a:srcRect/>
+              <a:stretch>
+                <a:fillRect/>
+              </a:stretch>
+            </p:blipFill>
+            <p:spPr bwMode="auto">
+              <a:xfrm rot="10800000" flipV="1">
+                <a:off x="4955619" y="3683221"/>
+                <a:ext cx="623890" cy="628668"/>
+              </a:xfrm>
+              <a:prstGeom prst="rect">
+                <a:avLst/>
+              </a:prstGeom>
+              <a:noFill/>
+              <a:extLst>
+                <a:ext uri="{909E8E84-426E-40DD-AFC4-6F175D3DCCD1}">
+                  <a14:hiddenFill xmlns:a14="http://schemas.microsoft.com/office/drawing/2010/main">
+                    <a:solidFill>
+                      <a:srgbClr val="FFFFFF"/>
+                    </a:solidFill>
+                  </a14:hiddenFill>
+                </a:ext>
+              </a:extLst>
+            </p:spPr>
+          </p:pic>
+          <p:pic>
+            <p:nvPicPr>
+              <p:cNvPr id="16" name="Picture 15">
+                <a:extLst>
+                  <a:ext uri="{FF2B5EF4-FFF2-40B4-BE49-F238E27FC236}">
+                    <a16:creationId xmlns:a16="http://schemas.microsoft.com/office/drawing/2014/main" id="{343D9D26-B057-F882-0C21-621135923666}"/>
+                  </a:ext>
+                </a:extLst>
+              </p:cNvPr>
+              <p:cNvPicPr>
+                <a:picLocks noChangeAspect="1"/>
+              </p:cNvPicPr>
+              <p:nvPr/>
+            </p:nvPicPr>
+            <p:blipFill rotWithShape="1">
+              <a:blip r:embed="rId7">
+                <a:extLst>
+                  <a:ext uri="{BEBA8EAE-BF5A-486C-A8C5-ECC9F3942E4B}">
+                    <a14:imgProps xmlns:a14="http://schemas.microsoft.com/office/drawing/2010/main">
+                      <a14:imgLayer r:embed="rId8">
+                        <a14:imgEffect>
+                          <a14:backgroundRemoval t="10000" b="90000" l="10000" r="90000"/>
+                        </a14:imgEffect>
+                      </a14:imgLayer>
+                    </a14:imgProps>
+                  </a:ext>
+                </a:extLst>
+              </a:blip>
+              <a:srcRect r="15386"/>
+              <a:stretch/>
+            </p:blipFill>
+            <p:spPr>
+              <a:xfrm>
+                <a:off x="4955618" y="4470054"/>
+                <a:ext cx="623891" cy="470834"/>
+              </a:xfrm>
+              <a:prstGeom prst="rect">
+                <a:avLst/>
+              </a:prstGeom>
+              <a:effectLst/>
+            </p:spPr>
+          </p:pic>
+          <p:pic>
+            <p:nvPicPr>
+              <p:cNvPr id="17" name="Picture 8" descr="Home | MTCUP">
+                <a:extLst>
+                  <a:ext uri="{FF2B5EF4-FFF2-40B4-BE49-F238E27FC236}">
+                    <a16:creationId xmlns:a16="http://schemas.microsoft.com/office/drawing/2014/main" id="{8C52BC41-98F9-1E1E-97AC-743C4B65FF50}"/>
+                  </a:ext>
+                </a:extLst>
+              </p:cNvPr>
+              <p:cNvPicPr>
+                <a:picLocks noChangeAspect="1" noChangeArrowheads="1"/>
+              </p:cNvPicPr>
+              <p:nvPr/>
+            </p:nvPicPr>
+            <p:blipFill>
+              <a:blip r:embed="rId9" cstate="print">
+                <a:extLst>
+                  <a:ext uri="{28A0092B-C50C-407E-A947-70E740481C1C}">
+                    <a14:useLocalDpi xmlns:a14="http://schemas.microsoft.com/office/drawing/2010/main" val="0"/>
+                  </a:ext>
+                </a:extLst>
+              </a:blip>
+              <a:srcRect/>
+              <a:stretch>
+                <a:fillRect/>
+              </a:stretch>
+            </p:blipFill>
+            <p:spPr bwMode="auto">
+              <a:xfrm>
+                <a:off x="3836747" y="3007736"/>
+                <a:ext cx="442047" cy="442047"/>
+              </a:xfrm>
+              <a:prstGeom prst="rect">
+                <a:avLst/>
+              </a:prstGeom>
+              <a:noFill/>
+              <a:extLst>
+                <a:ext uri="{909E8E84-426E-40DD-AFC4-6F175D3DCCD1}">
+                  <a14:hiddenFill xmlns:a14="http://schemas.microsoft.com/office/drawing/2010/main">
+                    <a:solidFill>
+                      <a:srgbClr val="FFFFFF"/>
+                    </a:solidFill>
+                  </a14:hiddenFill>
+                </a:ext>
+              </a:extLst>
+            </p:spPr>
+          </p:pic>
+          <p:sp>
+            <p:nvSpPr>
+              <p:cNvPr id="18" name="TextBox 17">
+                <a:extLst>
+                  <a:ext uri="{FF2B5EF4-FFF2-40B4-BE49-F238E27FC236}">
+                    <a16:creationId xmlns:a16="http://schemas.microsoft.com/office/drawing/2014/main" id="{0AB231C4-9E2D-1929-1EF3-E84F2B00FF48}"/>
+                  </a:ext>
+                </a:extLst>
+              </p:cNvPr>
+              <p:cNvSpPr txBox="1"/>
+              <p:nvPr/>
+            </p:nvSpPr>
+            <p:spPr>
+              <a:xfrm>
+                <a:off x="3745379" y="3268300"/>
+                <a:ext cx="624781" cy="230832"/>
+              </a:xfrm>
+              <a:prstGeom prst="rect">
+                <a:avLst/>
+              </a:prstGeom>
+              <a:noFill/>
+            </p:spPr>
+            <p:txBody>
+              <a:bodyPr wrap="square" rtlCol="0">
+                <a:spAutoFit/>
+              </a:bodyPr>
+              <a:lstStyle/>
+              <a:p>
+                <a:pPr algn="ctr"/>
+                <a:r>
+                  <a:rPr lang="en-US" sz="900" b="1" dirty="0">
+                    <a:solidFill>
+                      <a:schemeClr val="bg1"/>
+                    </a:solidFill>
+                  </a:rPr>
+                  <a:t>Adapter</a:t>
+                </a:r>
+              </a:p>
+            </p:txBody>
+          </p:sp>
+          <p:sp>
+            <p:nvSpPr>
+              <p:cNvPr id="19" name="TextBox 18">
+                <a:extLst>
+                  <a:ext uri="{FF2B5EF4-FFF2-40B4-BE49-F238E27FC236}">
+                    <a16:creationId xmlns:a16="http://schemas.microsoft.com/office/drawing/2014/main" id="{2F366A60-5FA2-CC86-4FC1-0725E16DAC7F}"/>
+                  </a:ext>
+                </a:extLst>
+              </p:cNvPr>
+              <p:cNvSpPr txBox="1"/>
+              <p:nvPr/>
+            </p:nvSpPr>
+            <p:spPr>
+              <a:xfrm>
+                <a:off x="3684758" y="3499132"/>
+                <a:ext cx="841691" cy="692497"/>
+              </a:xfrm>
+              <a:prstGeom prst="rect">
+                <a:avLst/>
+              </a:prstGeom>
+              <a:noFill/>
+            </p:spPr>
+            <p:txBody>
+              <a:bodyPr wrap="square" lIns="0" tIns="0" rIns="0" bIns="0" rtlCol="0">
+                <a:spAutoFit/>
+              </a:bodyPr>
+              <a:lstStyle/>
+              <a:p>
+                <a:pPr marL="171450" indent="-171450">
+                  <a:buFont typeface="Arial" panose="020B0604020202020204" pitchFamily="34" charset="0"/>
+                  <a:buChar char="•"/>
+                </a:pPr>
+                <a:r>
+                  <a:rPr lang="en-US" sz="900" dirty="0"/>
+                  <a:t>Spindle</a:t>
+                </a:r>
+              </a:p>
+              <a:p>
+                <a:pPr marL="171450" indent="-171450">
+                  <a:buFont typeface="Arial" panose="020B0604020202020204" pitchFamily="34" charset="0"/>
+                  <a:buChar char="•"/>
+                </a:pPr>
+                <a:r>
+                  <a:rPr lang="en-US" sz="900" dirty="0"/>
+                  <a:t>Position</a:t>
+                </a:r>
+              </a:p>
+              <a:p>
+                <a:pPr marL="171450" indent="-171450">
+                  <a:buFont typeface="Arial" panose="020B0604020202020204" pitchFamily="34" charset="0"/>
+                  <a:buChar char="•"/>
+                </a:pPr>
+                <a:r>
+                  <a:rPr lang="en-US" sz="900" dirty="0"/>
+                  <a:t>Execution</a:t>
+                </a:r>
+              </a:p>
+              <a:p>
+                <a:pPr marL="171450" indent="-171450">
+                  <a:buFont typeface="Arial" panose="020B0604020202020204" pitchFamily="34" charset="0"/>
+                  <a:buChar char="•"/>
+                </a:pPr>
+                <a:r>
+                  <a:rPr lang="en-US" sz="900" dirty="0"/>
+                  <a:t>Tool number</a:t>
+                </a:r>
+              </a:p>
+              <a:p>
+                <a:pPr marL="171450" indent="-171450">
+                  <a:buFont typeface="Arial" panose="020B0604020202020204" pitchFamily="34" charset="0"/>
+                  <a:buChar char="•"/>
+                </a:pPr>
+                <a:r>
+                  <a:rPr lang="en-US" sz="900" dirty="0"/>
+                  <a:t>…</a:t>
+                </a:r>
+              </a:p>
+            </p:txBody>
+          </p:sp>
+          <p:pic>
+            <p:nvPicPr>
+              <p:cNvPr id="20" name="Picture 12" descr="MTConnect Adapters List – 2019 (Manufacturers and Protocols) | Relyum">
+                <a:extLst>
+                  <a:ext uri="{FF2B5EF4-FFF2-40B4-BE49-F238E27FC236}">
+                    <a16:creationId xmlns:a16="http://schemas.microsoft.com/office/drawing/2014/main" id="{9DB660DE-BE24-4DEE-52D4-6DEFAC5492AD}"/>
+                  </a:ext>
+                </a:extLst>
+              </p:cNvPr>
+              <p:cNvPicPr>
+                <a:picLocks noChangeAspect="1" noChangeArrowheads="1"/>
+              </p:cNvPicPr>
+              <p:nvPr/>
+            </p:nvPicPr>
+            <p:blipFill>
+              <a:blip r:embed="rId10" cstate="print">
+                <a:extLst>
+                  <a:ext uri="{28A0092B-C50C-407E-A947-70E740481C1C}">
+                    <a14:useLocalDpi xmlns:a14="http://schemas.microsoft.com/office/drawing/2010/main" val="0"/>
+                  </a:ext>
+                </a:extLst>
+              </a:blip>
+              <a:srcRect/>
+              <a:stretch>
+                <a:fillRect/>
+              </a:stretch>
+            </p:blipFill>
+            <p:spPr bwMode="auto">
+              <a:xfrm>
+                <a:off x="4423609" y="2417135"/>
+                <a:ext cx="1257300" cy="394710"/>
+              </a:xfrm>
+              <a:prstGeom prst="rect">
+                <a:avLst/>
+              </a:prstGeom>
+              <a:noFill/>
+              <a:extLst>
+                <a:ext uri="{909E8E84-426E-40DD-AFC4-6F175D3DCCD1}">
+                  <a14:hiddenFill xmlns:a14="http://schemas.microsoft.com/office/drawing/2010/main">
+                    <a:solidFill>
+                      <a:srgbClr val="FFFFFF"/>
+                    </a:solidFill>
+                  </a14:hiddenFill>
+                </a:ext>
+              </a:extLst>
+            </p:spPr>
+          </p:pic>
+          <p:sp>
+            <p:nvSpPr>
+              <p:cNvPr id="21" name="TextBox 20">
+                <a:extLst>
+                  <a:ext uri="{FF2B5EF4-FFF2-40B4-BE49-F238E27FC236}">
+                    <a16:creationId xmlns:a16="http://schemas.microsoft.com/office/drawing/2014/main" id="{A39938D6-2159-7082-73F4-FAE2A861B0F7}"/>
+                  </a:ext>
+                </a:extLst>
+              </p:cNvPr>
+              <p:cNvSpPr txBox="1"/>
+              <p:nvPr/>
+            </p:nvSpPr>
+            <p:spPr>
+              <a:xfrm>
+                <a:off x="4473788" y="3445016"/>
+                <a:ext cx="1173078" cy="276999"/>
+              </a:xfrm>
+              <a:prstGeom prst="rect">
+                <a:avLst/>
+              </a:prstGeom>
+              <a:noFill/>
+            </p:spPr>
+            <p:txBody>
+              <a:bodyPr wrap="square" rtlCol="0">
+                <a:spAutoFit/>
+              </a:bodyPr>
+              <a:lstStyle/>
+              <a:p>
+                <a:pPr algn="ctr"/>
+                <a:r>
+                  <a:rPr lang="en-US" sz="1200" dirty="0"/>
+                  <a:t>Raspberry Pi</a:t>
+                </a:r>
+              </a:p>
+            </p:txBody>
+          </p:sp>
+          <p:cxnSp>
+            <p:nvCxnSpPr>
+              <p:cNvPr id="22" name="Connector: Elbow 21">
+                <a:extLst>
+                  <a:ext uri="{FF2B5EF4-FFF2-40B4-BE49-F238E27FC236}">
+                    <a16:creationId xmlns:a16="http://schemas.microsoft.com/office/drawing/2014/main" id="{AC0E2D0A-E867-706A-6304-B6A0EFE3A532}"/>
+                  </a:ext>
+                </a:extLst>
+              </p:cNvPr>
+              <p:cNvCxnSpPr>
+                <a:cxnSpLocks/>
+                <a:stCxn id="15" idx="1"/>
+                <a:endCxn id="12" idx="3"/>
+              </p:cNvCxnSpPr>
+              <p:nvPr/>
+            </p:nvCxnSpPr>
+            <p:spPr>
+              <a:xfrm flipH="1" flipV="1">
+                <a:off x="5543551" y="3163555"/>
+                <a:ext cx="35958" cy="834000"/>
+              </a:xfrm>
+              <a:prstGeom prst="bentConnector3">
+                <a:avLst>
+                  <a:gd name="adj1" fmla="val -635742"/>
+                </a:avLst>
+              </a:prstGeom>
+              <a:ln>
+                <a:solidFill>
+                  <a:schemeClr val="tx1"/>
+                </a:solidFill>
+                <a:tailEnd type="triangle"/>
+              </a:ln>
+            </p:spPr>
+            <p:style>
+              <a:lnRef idx="1">
+                <a:schemeClr val="accent1"/>
+              </a:lnRef>
+              <a:fillRef idx="0">
+                <a:schemeClr val="accent1"/>
+              </a:fillRef>
+              <a:effectRef idx="0">
+                <a:schemeClr val="accent1"/>
+              </a:effectRef>
+              <a:fontRef idx="minor">
+                <a:schemeClr val="tx1"/>
+              </a:fontRef>
+            </p:style>
+          </p:cxnSp>
+          <p:cxnSp>
+            <p:nvCxnSpPr>
+              <p:cNvPr id="23" name="Connector: Elbow 22">
+                <a:extLst>
+                  <a:ext uri="{FF2B5EF4-FFF2-40B4-BE49-F238E27FC236}">
+                    <a16:creationId xmlns:a16="http://schemas.microsoft.com/office/drawing/2014/main" id="{CC37D4BB-7878-0B2D-4643-176D9D5E1EFC}"/>
+                  </a:ext>
+                </a:extLst>
+              </p:cNvPr>
+              <p:cNvCxnSpPr>
+                <a:cxnSpLocks/>
+                <a:stCxn id="16" idx="3"/>
+                <a:endCxn id="12" idx="3"/>
+              </p:cNvCxnSpPr>
+              <p:nvPr/>
+            </p:nvCxnSpPr>
+            <p:spPr>
+              <a:xfrm flipH="1" flipV="1">
+                <a:off x="5543551" y="3163555"/>
+                <a:ext cx="35958" cy="1541916"/>
+              </a:xfrm>
+              <a:prstGeom prst="bentConnector3">
+                <a:avLst>
+                  <a:gd name="adj1" fmla="val -635742"/>
+                </a:avLst>
+              </a:prstGeom>
+              <a:ln>
+                <a:solidFill>
+                  <a:schemeClr val="tx1"/>
+                </a:solidFill>
+                <a:tailEnd type="triangle"/>
+              </a:ln>
+            </p:spPr>
+            <p:style>
+              <a:lnRef idx="1">
+                <a:schemeClr val="accent1"/>
+              </a:lnRef>
+              <a:fillRef idx="0">
+                <a:schemeClr val="accent1"/>
+              </a:fillRef>
+              <a:effectRef idx="0">
+                <a:schemeClr val="accent1"/>
+              </a:effectRef>
+              <a:fontRef idx="minor">
+                <a:schemeClr val="tx1"/>
+              </a:fontRef>
+            </p:style>
+          </p:cxnSp>
+          <p:sp>
+            <p:nvSpPr>
+              <p:cNvPr id="24" name="TextBox 23">
+                <a:extLst>
+                  <a:ext uri="{FF2B5EF4-FFF2-40B4-BE49-F238E27FC236}">
+                    <a16:creationId xmlns:a16="http://schemas.microsoft.com/office/drawing/2014/main" id="{02E2D17E-A117-F32C-CA7B-650B69FA3888}"/>
+                  </a:ext>
+                </a:extLst>
+              </p:cNvPr>
+              <p:cNvSpPr txBox="1"/>
+              <p:nvPr/>
+            </p:nvSpPr>
+            <p:spPr>
+              <a:xfrm>
+                <a:off x="4689776" y="4146169"/>
+                <a:ext cx="916974" cy="276999"/>
+              </a:xfrm>
+              <a:prstGeom prst="rect">
+                <a:avLst/>
+              </a:prstGeom>
+              <a:noFill/>
+            </p:spPr>
+            <p:txBody>
+              <a:bodyPr wrap="square" rtlCol="0">
+                <a:spAutoFit/>
+              </a:bodyPr>
+              <a:lstStyle/>
+              <a:p>
+                <a:pPr algn="ctr"/>
+                <a:r>
+                  <a:rPr lang="en-US" sz="1200" dirty="0"/>
+                  <a:t>ISS @base</a:t>
+                </a:r>
+              </a:p>
+            </p:txBody>
+          </p:sp>
+          <p:sp>
+            <p:nvSpPr>
+              <p:cNvPr id="25" name="TextBox 24">
+                <a:extLst>
+                  <a:ext uri="{FF2B5EF4-FFF2-40B4-BE49-F238E27FC236}">
+                    <a16:creationId xmlns:a16="http://schemas.microsoft.com/office/drawing/2014/main" id="{DC05F7B0-CD5D-B7D3-E587-93FAD69B4BB3}"/>
+                  </a:ext>
+                </a:extLst>
+              </p:cNvPr>
+              <p:cNvSpPr txBox="1"/>
+              <p:nvPr/>
+            </p:nvSpPr>
+            <p:spPr>
+              <a:xfrm>
+                <a:off x="4449982" y="4854085"/>
+                <a:ext cx="1476795" cy="276999"/>
+              </a:xfrm>
+              <a:prstGeom prst="rect">
+                <a:avLst/>
+              </a:prstGeom>
+              <a:noFill/>
+            </p:spPr>
+            <p:txBody>
+              <a:bodyPr wrap="square" rtlCol="0">
+                <a:spAutoFit/>
+              </a:bodyPr>
+              <a:lstStyle/>
+              <a:p>
+                <a:pPr algn="ctr"/>
+                <a:r>
+                  <a:rPr lang="en-US" sz="1200" dirty="0"/>
+                  <a:t>Microphone @inside</a:t>
+                </a:r>
+              </a:p>
+            </p:txBody>
+          </p:sp>
+          <p:pic>
+            <p:nvPicPr>
+              <p:cNvPr id="26" name="Picture 2" descr="MySQL - LiveAgent">
+                <a:extLst>
+                  <a:ext uri="{FF2B5EF4-FFF2-40B4-BE49-F238E27FC236}">
+                    <a16:creationId xmlns:a16="http://schemas.microsoft.com/office/drawing/2014/main" id="{7FFA2E4E-B697-C024-520A-6CDB38CC28C4}"/>
+                  </a:ext>
+                </a:extLst>
+              </p:cNvPr>
+              <p:cNvPicPr>
+                <a:picLocks noChangeAspect="1" noChangeArrowheads="1"/>
+              </p:cNvPicPr>
+              <p:nvPr/>
+            </p:nvPicPr>
+            <p:blipFill rotWithShape="1">
+              <a:blip r:embed="rId11" cstate="screen">
+                <a:extLst>
+                  <a:ext uri="{28A0092B-C50C-407E-A947-70E740481C1C}">
+                    <a14:useLocalDpi xmlns:a14="http://schemas.microsoft.com/office/drawing/2010/main"/>
+                  </a:ext>
+                </a:extLst>
+              </a:blip>
+              <a:srcRect l="9063" t="16909" r="8457" b="16545"/>
+              <a:stretch/>
+            </p:blipFill>
+            <p:spPr bwMode="auto">
+              <a:xfrm>
+                <a:off x="6669492" y="2772022"/>
+                <a:ext cx="1143001" cy="614796"/>
+              </a:xfrm>
+              <a:prstGeom prst="rect">
+                <a:avLst/>
+              </a:prstGeom>
+              <a:noFill/>
+              <a:extLst>
+                <a:ext uri="{909E8E84-426E-40DD-AFC4-6F175D3DCCD1}">
+                  <a14:hiddenFill xmlns:a14="http://schemas.microsoft.com/office/drawing/2010/main">
+                    <a:solidFill>
+                      <a:srgbClr val="FFFFFF"/>
+                    </a:solidFill>
+                  </a14:hiddenFill>
+                </a:ext>
+              </a:extLst>
+            </p:spPr>
+          </p:pic>
+          <p:sp>
+            <p:nvSpPr>
+              <p:cNvPr id="27" name="TextBox 26">
+                <a:extLst>
+                  <a:ext uri="{FF2B5EF4-FFF2-40B4-BE49-F238E27FC236}">
+                    <a16:creationId xmlns:a16="http://schemas.microsoft.com/office/drawing/2014/main" id="{7CDC2BA5-E4C1-F295-4207-72F6A01CE720}"/>
+                  </a:ext>
+                </a:extLst>
+              </p:cNvPr>
+              <p:cNvSpPr txBox="1"/>
+              <p:nvPr/>
+            </p:nvSpPr>
+            <p:spPr>
+              <a:xfrm>
+                <a:off x="6504497" y="3341347"/>
+                <a:ext cx="1472988" cy="430887"/>
+              </a:xfrm>
+              <a:prstGeom prst="rect">
+                <a:avLst/>
+              </a:prstGeom>
+              <a:noFill/>
+            </p:spPr>
+            <p:txBody>
+              <a:bodyPr wrap="square" rtlCol="0">
+                <a:spAutoFit/>
+              </a:bodyPr>
+              <a:lstStyle/>
+              <a:p>
+                <a:pPr algn="ctr"/>
+                <a:r>
+                  <a:rPr lang="en-US" sz="1050" dirty="0"/>
+                  <a:t>MySQL DB</a:t>
+                </a:r>
+              </a:p>
+              <a:p>
+                <a:pPr algn="ctr"/>
+                <a:r>
+                  <a:rPr lang="en-US" sz="1050" b="1" dirty="0"/>
+                  <a:t>(Purdue SENSE server)</a:t>
+                </a:r>
+              </a:p>
+            </p:txBody>
+          </p:sp>
+          <p:pic>
+            <p:nvPicPr>
+              <p:cNvPr id="28" name="Picture 8">
+                <a:extLst>
+                  <a:ext uri="{FF2B5EF4-FFF2-40B4-BE49-F238E27FC236}">
+                    <a16:creationId xmlns:a16="http://schemas.microsoft.com/office/drawing/2014/main" id="{CF9DD7D0-A488-A0DE-F073-CC0D853B1DEE}"/>
+                  </a:ext>
+                </a:extLst>
+              </p:cNvPr>
+              <p:cNvPicPr>
+                <a:picLocks noChangeAspect="1" noChangeArrowheads="1"/>
+              </p:cNvPicPr>
+              <p:nvPr/>
+            </p:nvPicPr>
+            <p:blipFill>
+              <a:blip r:embed="rId12" cstate="print">
+                <a:extLst>
+                  <a:ext uri="{28A0092B-C50C-407E-A947-70E740481C1C}">
+                    <a14:useLocalDpi xmlns:a14="http://schemas.microsoft.com/office/drawing/2010/main"/>
+                  </a:ext>
+                </a:extLst>
+              </a:blip>
+              <a:srcRect/>
+              <a:stretch>
+                <a:fillRect/>
+              </a:stretch>
+            </p:blipFill>
+            <p:spPr bwMode="auto">
+              <a:xfrm>
+                <a:off x="8598904" y="2799235"/>
+                <a:ext cx="633207" cy="645612"/>
+              </a:xfrm>
+              <a:prstGeom prst="rect">
+                <a:avLst/>
+              </a:prstGeom>
+              <a:noFill/>
+              <a:extLst>
+                <a:ext uri="{909E8E84-426E-40DD-AFC4-6F175D3DCCD1}">
+                  <a14:hiddenFill xmlns:a14="http://schemas.microsoft.com/office/drawing/2010/main">
+                    <a:solidFill>
+                      <a:srgbClr val="FFFFFF"/>
+                    </a:solidFill>
+                  </a14:hiddenFill>
+                </a:ext>
+              </a:extLst>
+            </p:spPr>
+          </p:pic>
+          <p:sp>
+            <p:nvSpPr>
+              <p:cNvPr id="29" name="TextBox 28">
+                <a:extLst>
+                  <a:ext uri="{FF2B5EF4-FFF2-40B4-BE49-F238E27FC236}">
+                    <a16:creationId xmlns:a16="http://schemas.microsoft.com/office/drawing/2014/main" id="{95F4B933-7DD9-65B9-D0DB-B79B33C593E5}"/>
+                  </a:ext>
+                </a:extLst>
+              </p:cNvPr>
+              <p:cNvSpPr txBox="1"/>
+              <p:nvPr/>
+            </p:nvSpPr>
+            <p:spPr>
+              <a:xfrm>
+                <a:off x="8186979" y="3423771"/>
+                <a:ext cx="1472988" cy="430887"/>
+              </a:xfrm>
+              <a:prstGeom prst="rect">
+                <a:avLst/>
+              </a:prstGeom>
+              <a:noFill/>
+            </p:spPr>
+            <p:txBody>
+              <a:bodyPr wrap="square" rtlCol="0">
+                <a:spAutoFit/>
+              </a:bodyPr>
+              <a:lstStyle/>
+              <a:p>
+                <a:pPr algn="ctr"/>
+                <a:r>
+                  <a:rPr lang="en-US" sz="1050" dirty="0"/>
+                  <a:t>Grafana dashboard</a:t>
+                </a:r>
+              </a:p>
+              <a:p>
+                <a:pPr algn="ctr"/>
+                <a:r>
+                  <a:rPr lang="en-US" sz="1050" b="1" dirty="0"/>
+                  <a:t>(Purdue SENSE server)</a:t>
+                </a:r>
+              </a:p>
+            </p:txBody>
+          </p:sp>
+          <p:cxnSp>
+            <p:nvCxnSpPr>
+              <p:cNvPr id="30" name="Connector: Elbow 29">
+                <a:extLst>
+                  <a:ext uri="{FF2B5EF4-FFF2-40B4-BE49-F238E27FC236}">
+                    <a16:creationId xmlns:a16="http://schemas.microsoft.com/office/drawing/2014/main" id="{F8F621CB-D7BF-B686-0511-0560F6CB6116}"/>
+                  </a:ext>
+                </a:extLst>
+              </p:cNvPr>
+              <p:cNvCxnSpPr>
+                <a:cxnSpLocks/>
+                <a:stCxn id="20" idx="3"/>
+                <a:endCxn id="26" idx="1"/>
+              </p:cNvCxnSpPr>
+              <p:nvPr/>
+            </p:nvCxnSpPr>
+            <p:spPr>
+              <a:xfrm>
+                <a:off x="5680909" y="2614490"/>
+                <a:ext cx="988583" cy="464930"/>
+              </a:xfrm>
+              <a:prstGeom prst="bentConnector3">
+                <a:avLst>
+                  <a:gd name="adj1" fmla="val 50000"/>
+                </a:avLst>
+              </a:prstGeom>
+              <a:ln>
+                <a:solidFill>
+                  <a:schemeClr val="tx1"/>
+                </a:solidFill>
+                <a:tailEnd type="triangle"/>
+              </a:ln>
+            </p:spPr>
+            <p:style>
+              <a:lnRef idx="1">
+                <a:schemeClr val="accent1"/>
+              </a:lnRef>
+              <a:fillRef idx="0">
+                <a:schemeClr val="accent1"/>
+              </a:fillRef>
+              <a:effectRef idx="0">
+                <a:schemeClr val="accent1"/>
+              </a:effectRef>
+              <a:fontRef idx="minor">
+                <a:schemeClr val="tx1"/>
+              </a:fontRef>
+            </p:style>
+          </p:cxnSp>
+          <p:cxnSp>
+            <p:nvCxnSpPr>
+              <p:cNvPr id="31" name="Connector: Elbow 30">
+                <a:extLst>
+                  <a:ext uri="{FF2B5EF4-FFF2-40B4-BE49-F238E27FC236}">
+                    <a16:creationId xmlns:a16="http://schemas.microsoft.com/office/drawing/2014/main" id="{3AF89651-FA53-F4DA-1BFB-B1A63AEA6426}"/>
+                  </a:ext>
+                </a:extLst>
+              </p:cNvPr>
+              <p:cNvCxnSpPr>
+                <a:cxnSpLocks/>
+                <a:stCxn id="26" idx="3"/>
+                <a:endCxn id="28" idx="1"/>
+              </p:cNvCxnSpPr>
+              <p:nvPr/>
+            </p:nvCxnSpPr>
+            <p:spPr>
+              <a:xfrm>
+                <a:off x="7812493" y="3079420"/>
+                <a:ext cx="786411" cy="42621"/>
+              </a:xfrm>
+              <a:prstGeom prst="bentConnector3">
+                <a:avLst>
+                  <a:gd name="adj1" fmla="val 50000"/>
+                </a:avLst>
+              </a:prstGeom>
+              <a:ln>
+                <a:solidFill>
+                  <a:schemeClr val="tx1"/>
+                </a:solidFill>
+                <a:tailEnd type="triangle"/>
+              </a:ln>
+            </p:spPr>
+            <p:style>
+              <a:lnRef idx="1">
+                <a:schemeClr val="accent1"/>
+              </a:lnRef>
+              <a:fillRef idx="0">
+                <a:schemeClr val="accent1"/>
+              </a:fillRef>
+              <a:effectRef idx="0">
+                <a:schemeClr val="accent1"/>
+              </a:effectRef>
+              <a:fontRef idx="minor">
+                <a:schemeClr val="tx1"/>
+              </a:fontRef>
+            </p:style>
+          </p:cxnSp>
+          <p:sp>
+            <p:nvSpPr>
+              <p:cNvPr id="32" name="TextBox 31">
+                <a:extLst>
+                  <a:ext uri="{FF2B5EF4-FFF2-40B4-BE49-F238E27FC236}">
+                    <a16:creationId xmlns:a16="http://schemas.microsoft.com/office/drawing/2014/main" id="{50491BF6-EA7A-B6A9-897C-879E4CB9D6D0}"/>
+                  </a:ext>
+                </a:extLst>
+              </p:cNvPr>
+              <p:cNvSpPr txBox="1"/>
+              <p:nvPr/>
+            </p:nvSpPr>
+            <p:spPr>
+              <a:xfrm>
+                <a:off x="6310761" y="2288563"/>
+                <a:ext cx="2016768" cy="523220"/>
+              </a:xfrm>
+              <a:prstGeom prst="rect">
+                <a:avLst/>
+              </a:prstGeom>
+              <a:noFill/>
+            </p:spPr>
+            <p:txBody>
+              <a:bodyPr wrap="square" rtlCol="0">
+                <a:spAutoFit/>
+              </a:bodyPr>
+              <a:lstStyle/>
+              <a:p>
+                <a:pPr algn="ctr"/>
+                <a:r>
+                  <a:rPr lang="en-US" sz="1400" dirty="0"/>
+                  <a:t>Real-time visualization and data analytics</a:t>
+                </a:r>
+              </a:p>
+            </p:txBody>
+          </p:sp>
+          <p:pic>
+            <p:nvPicPr>
+              <p:cNvPr id="33" name="Picture 2" descr="How OpenBOM integrates with Box.com for sharing files in a secured  environment | by OpenBOM (openbom.com) | Medium">
+                <a:extLst>
+                  <a:ext uri="{FF2B5EF4-FFF2-40B4-BE49-F238E27FC236}">
+                    <a16:creationId xmlns:a16="http://schemas.microsoft.com/office/drawing/2014/main" id="{F4D5086A-CB3A-ADD7-04D3-12C9AF387D99}"/>
+                  </a:ext>
+                </a:extLst>
+              </p:cNvPr>
+              <p:cNvPicPr>
+                <a:picLocks noChangeAspect="1" noChangeArrowheads="1"/>
+              </p:cNvPicPr>
+              <p:nvPr/>
+            </p:nvPicPr>
+            <p:blipFill>
+              <a:blip r:embed="rId13" cstate="print">
+                <a:extLst>
+                  <a:ext uri="{28A0092B-C50C-407E-A947-70E740481C1C}">
+                    <a14:useLocalDpi xmlns:a14="http://schemas.microsoft.com/office/drawing/2010/main"/>
+                  </a:ext>
+                </a:extLst>
+              </a:blip>
+              <a:srcRect/>
+              <a:stretch>
+                <a:fillRect/>
+              </a:stretch>
+            </p:blipFill>
+            <p:spPr bwMode="auto">
+              <a:xfrm>
+                <a:off x="8565658" y="4156366"/>
+                <a:ext cx="758443" cy="563145"/>
+              </a:xfrm>
+              <a:prstGeom prst="rect">
+                <a:avLst/>
+              </a:prstGeom>
+              <a:noFill/>
+              <a:extLst>
+                <a:ext uri="{909E8E84-426E-40DD-AFC4-6F175D3DCCD1}">
+                  <a14:hiddenFill xmlns:a14="http://schemas.microsoft.com/office/drawing/2010/main">
+                    <a:solidFill>
+                      <a:srgbClr val="FFFFFF"/>
+                    </a:solidFill>
+                  </a14:hiddenFill>
+                </a:ext>
+              </a:extLst>
+            </p:spPr>
+          </p:pic>
+          <p:sp>
+            <p:nvSpPr>
+              <p:cNvPr id="34" name="Arrow: Right 33">
+                <a:extLst>
+                  <a:ext uri="{FF2B5EF4-FFF2-40B4-BE49-F238E27FC236}">
+                    <a16:creationId xmlns:a16="http://schemas.microsoft.com/office/drawing/2014/main" id="{761A5BDA-1E71-110C-845F-57CCA9B05E86}"/>
+                  </a:ext>
+                </a:extLst>
+              </p:cNvPr>
+              <p:cNvSpPr/>
+              <p:nvPr/>
+            </p:nvSpPr>
+            <p:spPr>
+              <a:xfrm>
+                <a:off x="5638974" y="4276709"/>
+                <a:ext cx="2863261" cy="819856"/>
+              </a:xfrm>
+              <a:prstGeom prst="rightArrow">
+                <a:avLst>
+                  <a:gd name="adj1" fmla="val 50000"/>
+                  <a:gd name="adj2" fmla="val 51162"/>
+                </a:avLst>
+              </a:prstGeom>
+              <a:gradFill>
+                <a:gsLst>
+                  <a:gs pos="0">
+                    <a:schemeClr val="bg1">
+                      <a:alpha val="0"/>
+                    </a:schemeClr>
+                  </a:gs>
+                  <a:gs pos="36000">
+                    <a:schemeClr val="accent1">
+                      <a:lumMod val="60000"/>
+                      <a:lumOff val="40000"/>
+                    </a:schemeClr>
+                  </a:gs>
+                  <a:gs pos="80000">
+                    <a:schemeClr val="accent1">
+                      <a:lumMod val="75000"/>
+                    </a:schemeClr>
+                  </a:gs>
+                  <a:gs pos="100000">
+                    <a:schemeClr val="accent1">
+                      <a:lumMod val="50000"/>
+                    </a:schemeClr>
+                  </a:gs>
+                </a:gsLst>
+                <a:lin ang="0" scaled="0"/>
+              </a:gradFill>
+              <a:ln>
+                <a:noFill/>
+              </a:ln>
+            </p:spPr>
+            <p:style>
+              <a:lnRef idx="2">
+                <a:schemeClr val="accent1">
+                  <a:shade val="50000"/>
+                </a:schemeClr>
+              </a:lnRef>
+              <a:fillRef idx="1">
+                <a:schemeClr val="accent1"/>
+              </a:fillRef>
+              <a:effectRef idx="0">
+                <a:schemeClr val="accent1"/>
+              </a:effectRef>
+              <a:fontRef idx="minor">
+                <a:schemeClr val="lt1"/>
+              </a:fontRef>
+            </p:style>
+            <p:txBody>
+              <a:bodyPr rtlCol="0" anchor="ctr"/>
+              <a:lstStyle/>
+              <a:p>
+                <a:pPr algn="r"/>
+                <a:r>
+                  <a:rPr lang="en-US" sz="1400" dirty="0">
+                    <a:solidFill>
+                      <a:schemeClr val="tx1"/>
+                    </a:solidFill>
+                  </a:rPr>
+                  <a:t>Raw IoT sensor data collection</a:t>
+                </a:r>
+              </a:p>
+            </p:txBody>
+          </p:sp>
+          <p:pic>
+            <p:nvPicPr>
+              <p:cNvPr id="35" name="Picture 4" descr="Wav file format symbol - Free interface icons">
+                <a:extLst>
+                  <a:ext uri="{FF2B5EF4-FFF2-40B4-BE49-F238E27FC236}">
+                    <a16:creationId xmlns:a16="http://schemas.microsoft.com/office/drawing/2014/main" id="{47E629E6-A4DD-BC67-62D1-2BA911F92ECD}"/>
+                  </a:ext>
+                </a:extLst>
+              </p:cNvPr>
+              <p:cNvPicPr>
+                <a:picLocks noChangeAspect="1" noChangeArrowheads="1"/>
+              </p:cNvPicPr>
+              <p:nvPr/>
+            </p:nvPicPr>
+            <p:blipFill>
+              <a:blip r:embed="rId14" cstate="print">
+                <a:extLst>
+                  <a:ext uri="{28A0092B-C50C-407E-A947-70E740481C1C}">
+                    <a14:useLocalDpi xmlns:a14="http://schemas.microsoft.com/office/drawing/2010/main"/>
+                  </a:ext>
+                </a:extLst>
+              </a:blip>
+              <a:srcRect/>
+              <a:stretch>
+                <a:fillRect/>
+              </a:stretch>
+            </p:blipFill>
+            <p:spPr bwMode="auto">
+              <a:xfrm>
+                <a:off x="6721597" y="3961008"/>
+                <a:ext cx="337235" cy="337235"/>
+              </a:xfrm>
+              <a:prstGeom prst="rect">
+                <a:avLst/>
+              </a:prstGeom>
+              <a:noFill/>
+              <a:extLst>
+                <a:ext uri="{909E8E84-426E-40DD-AFC4-6F175D3DCCD1}">
+                  <a14:hiddenFill xmlns:a14="http://schemas.microsoft.com/office/drawing/2010/main">
+                    <a:solidFill>
+                      <a:srgbClr val="FFFFFF"/>
+                    </a:solidFill>
+                  </a14:hiddenFill>
+                </a:ext>
+              </a:extLst>
+            </p:spPr>
+          </p:pic>
+          <p:sp>
+            <p:nvSpPr>
+              <p:cNvPr id="36" name="TextBox 35">
+                <a:extLst>
+                  <a:ext uri="{FF2B5EF4-FFF2-40B4-BE49-F238E27FC236}">
+                    <a16:creationId xmlns:a16="http://schemas.microsoft.com/office/drawing/2014/main" id="{9FB63224-A9BA-048B-BCC5-BF7999E430E6}"/>
+                  </a:ext>
+                </a:extLst>
+              </p:cNvPr>
+              <p:cNvSpPr txBox="1"/>
+              <p:nvPr/>
+            </p:nvSpPr>
+            <p:spPr>
+              <a:xfrm>
+                <a:off x="6472817" y="4258873"/>
+                <a:ext cx="766263" cy="230832"/>
+              </a:xfrm>
+              <a:prstGeom prst="rect">
+                <a:avLst/>
+              </a:prstGeom>
+              <a:noFill/>
+            </p:spPr>
+            <p:txBody>
+              <a:bodyPr wrap="square" rtlCol="0">
+                <a:spAutoFit/>
+              </a:bodyPr>
+              <a:lstStyle/>
+              <a:p>
+                <a:pPr algn="ctr"/>
+                <a:r>
+                  <a:rPr lang="en-US" sz="900" dirty="0"/>
+                  <a:t>Sound data</a:t>
+                </a:r>
+              </a:p>
+            </p:txBody>
+          </p:sp>
+          <p:pic>
+            <p:nvPicPr>
+              <p:cNvPr id="37" name="Picture 10" descr="ECE Logos - Elmore Family School of Electrical and Computer Engineering -  Purdue University">
+                <a:extLst>
+                  <a:ext uri="{FF2B5EF4-FFF2-40B4-BE49-F238E27FC236}">
+                    <a16:creationId xmlns:a16="http://schemas.microsoft.com/office/drawing/2014/main" id="{E029815D-AB77-4D48-A98E-669AB1C162F8}"/>
+                  </a:ext>
+                </a:extLst>
+              </p:cNvPr>
+              <p:cNvPicPr>
+                <a:picLocks noChangeAspect="1" noChangeArrowheads="1"/>
+              </p:cNvPicPr>
+              <p:nvPr/>
+            </p:nvPicPr>
+            <p:blipFill>
+              <a:blip r:embed="rId15" cstate="print">
+                <a:extLst>
+                  <a:ext uri="{28A0092B-C50C-407E-A947-70E740481C1C}">
+                    <a14:useLocalDpi xmlns:a14="http://schemas.microsoft.com/office/drawing/2010/main" val="0"/>
+                  </a:ext>
+                </a:extLst>
+              </a:blip>
+              <a:srcRect/>
+              <a:stretch>
+                <a:fillRect/>
+              </a:stretch>
+            </p:blipFill>
+            <p:spPr bwMode="auto">
+              <a:xfrm>
+                <a:off x="1500312" y="2235670"/>
+                <a:ext cx="958149" cy="620402"/>
+              </a:xfrm>
+              <a:prstGeom prst="rect">
+                <a:avLst/>
+              </a:prstGeom>
+              <a:noFill/>
+              <a:extLst>
+                <a:ext uri="{909E8E84-426E-40DD-AFC4-6F175D3DCCD1}">
+                  <a14:hiddenFill xmlns:a14="http://schemas.microsoft.com/office/drawing/2010/main">
+                    <a:solidFill>
+                      <a:srgbClr val="FFFFFF"/>
+                    </a:solidFill>
+                  </a14:hiddenFill>
+                </a:ext>
+              </a:extLst>
+            </p:spPr>
+          </p:pic>
+          <p:pic>
+            <p:nvPicPr>
+              <p:cNvPr id="38" name="Picture 2" descr="National Science Foundation - Wikipedia">
+                <a:extLst>
+                  <a:ext uri="{FF2B5EF4-FFF2-40B4-BE49-F238E27FC236}">
+                    <a16:creationId xmlns:a16="http://schemas.microsoft.com/office/drawing/2014/main" id="{684C00F4-D15E-9CD1-7328-203D7E625AC3}"/>
+                  </a:ext>
+                </a:extLst>
+              </p:cNvPr>
+              <p:cNvPicPr>
+                <a:picLocks noChangeAspect="1" noChangeArrowheads="1"/>
+              </p:cNvPicPr>
+              <p:nvPr/>
+            </p:nvPicPr>
+            <p:blipFill>
+              <a:blip r:embed="rId16" cstate="print">
+                <a:extLst>
+                  <a:ext uri="{28A0092B-C50C-407E-A947-70E740481C1C}">
+                    <a14:useLocalDpi xmlns:a14="http://schemas.microsoft.com/office/drawing/2010/main" val="0"/>
+                  </a:ext>
+                </a:extLst>
+              </a:blip>
+              <a:srcRect/>
+              <a:stretch>
+                <a:fillRect/>
+              </a:stretch>
+            </p:blipFill>
+            <p:spPr bwMode="auto">
+              <a:xfrm>
+                <a:off x="2520171" y="2170528"/>
+                <a:ext cx="746864" cy="750686"/>
+              </a:xfrm>
+              <a:prstGeom prst="rect">
+                <a:avLst/>
+              </a:prstGeom>
+              <a:noFill/>
+              <a:extLst>
+                <a:ext uri="{909E8E84-426E-40DD-AFC4-6F175D3DCCD1}">
+                  <a14:hiddenFill xmlns:a14="http://schemas.microsoft.com/office/drawing/2010/main">
+                    <a:solidFill>
+                      <a:srgbClr val="FFFFFF"/>
+                    </a:solidFill>
+                  </a14:hiddenFill>
+                </a:ext>
+              </a:extLst>
+            </p:spPr>
+          </p:pic>
+          <p:sp>
+            <p:nvSpPr>
+              <p:cNvPr id="39" name="TextBox 38">
+                <a:extLst>
+                  <a:ext uri="{FF2B5EF4-FFF2-40B4-BE49-F238E27FC236}">
+                    <a16:creationId xmlns:a16="http://schemas.microsoft.com/office/drawing/2014/main" id="{A7D0876C-EF6E-03F5-06BF-47F52EF7362F}"/>
+                  </a:ext>
+                </a:extLst>
+              </p:cNvPr>
+              <p:cNvSpPr txBox="1"/>
+              <p:nvPr/>
+            </p:nvSpPr>
+            <p:spPr>
+              <a:xfrm>
+                <a:off x="8121286" y="4716478"/>
+                <a:ext cx="1569941" cy="461665"/>
+              </a:xfrm>
+              <a:prstGeom prst="rect">
+                <a:avLst/>
+              </a:prstGeom>
+              <a:noFill/>
+            </p:spPr>
+            <p:txBody>
+              <a:bodyPr wrap="square" rtlCol="0">
+                <a:spAutoFit/>
+              </a:bodyPr>
+              <a:lstStyle/>
+              <a:p>
+                <a:pPr algn="ctr"/>
+                <a:r>
+                  <a:rPr lang="en-US" sz="1200" b="1" dirty="0"/>
+                  <a:t>Purdue-BOX.COM cloud storage</a:t>
+                </a:r>
+              </a:p>
+            </p:txBody>
+          </p:sp>
+        </p:grpSp>
+      </p:grpSp>
+    </p:spTree>
+    <p:extLst>
+      <p:ext uri="{BB962C8B-B14F-4D97-AF65-F5344CB8AC3E}">
+        <p14:creationId xmlns:p14="http://schemas.microsoft.com/office/powerpoint/2010/main" val="659437855"/>
       </p:ext>
     </p:extLst>
   </p:cSld>

</xml_diff>